<commit_message>
Amélioration du rapport de stage
</commit_message>
<xml_diff>
--- a/Présentation de mémoire L3.pptx
+++ b/Présentation de mémoire L3.pptx
@@ -229,7 +229,7 @@
           <a:p>
             <a:fld id="{133D0A66-792F-4F77-B291-95C858246B95}" type="datetimeFigureOut">
               <a:rPr lang="fr-FR" smtClean="0"/>
-              <a:t>30/11/2023</a:t>
+              <a:t>01/12/2023</a:t>
             </a:fld>
             <a:endParaRPr lang="fr-FR"/>
           </a:p>
@@ -394,7 +394,7 @@
           <a:p>
             <a:fld id="{8775F7A3-26D0-4162-B6AA-21C8CCEB942F}" type="datetimeFigureOut">
               <a:rPr lang="fr-FR" smtClean="0"/>
-              <a:t>30/11/2023</a:t>
+              <a:t>01/12/2023</a:t>
             </a:fld>
             <a:endParaRPr lang="fr-FR"/>
           </a:p>
@@ -1617,19 +1617,7 @@
                 <a:ea typeface="+mn-ea"/>
                 <a:cs typeface="+mn-cs"/>
               </a:rPr>
-              <a:t>DHIS2 </a:t>
-            </a:r>
-            <a:r>
-              <a:rPr lang="fr-FR" sz="1200" kern="1200" dirty="0" smtClean="0">
-                <a:solidFill>
-                  <a:schemeClr val="tx1"/>
-                </a:solidFill>
-                <a:effectLst/>
-                <a:latin typeface="+mn-lt"/>
-                <a:ea typeface="+mn-ea"/>
-                <a:cs typeface="+mn-cs"/>
-              </a:rPr>
-              <a:t>est une plateforme logicielle open source destinée à la collecte, la validation, la visualisation et l'analyse des données dans le domaine de la santé.</a:t>
+              <a:t>DHIS2 est une plateforme logicielle open source destinée à la collecte, la validation, la visualisation et l'analyse des données dans le domaine de la santé.</a:t>
             </a:r>
           </a:p>
           <a:p>
@@ -2297,7 +2285,7 @@
           <a:p>
             <a:fld id="{B1E50EB4-5975-4030-B7E5-552F8398C0AC}" type="datetime1">
               <a:rPr lang="fr-FR" smtClean="0"/>
-              <a:t>30/11/2023</a:t>
+              <a:t>01/12/2023</a:t>
             </a:fld>
             <a:endParaRPr lang="fr-FR"/>
           </a:p>
@@ -2467,7 +2455,7 @@
           <a:p>
             <a:fld id="{2F14DBB5-6410-4C8A-92C0-64DAE7134526}" type="datetime1">
               <a:rPr lang="fr-FR" smtClean="0"/>
-              <a:t>30/11/2023</a:t>
+              <a:t>01/12/2023</a:t>
             </a:fld>
             <a:endParaRPr lang="fr-FR"/>
           </a:p>
@@ -2647,7 +2635,7 @@
           <a:p>
             <a:fld id="{4A4DD193-0D95-42CA-BAA4-BF368DC59BCE}" type="datetime1">
               <a:rPr lang="fr-FR" smtClean="0"/>
-              <a:t>30/11/2023</a:t>
+              <a:t>01/12/2023</a:t>
             </a:fld>
             <a:endParaRPr lang="fr-FR"/>
           </a:p>
@@ -2839,7 +2827,7 @@
           <a:p>
             <a:fld id="{63732620-C153-4889-806A-0EE13918376E}" type="datetime1">
               <a:rPr lang="fr-FR" smtClean="0"/>
-              <a:t>30/11/2023</a:t>
+              <a:t>01/12/2023</a:t>
             </a:fld>
             <a:endParaRPr lang="fr-FR"/>
           </a:p>
@@ -3009,7 +2997,7 @@
           <a:p>
             <a:fld id="{665D1196-11E3-4473-8460-25175E0562BA}" type="datetime1">
               <a:rPr lang="fr-FR" smtClean="0"/>
-              <a:t>30/11/2023</a:t>
+              <a:t>01/12/2023</a:t>
             </a:fld>
             <a:endParaRPr lang="fr-FR"/>
           </a:p>
@@ -3255,7 +3243,7 @@
           <a:p>
             <a:fld id="{3DA90518-B627-4085-AA9A-79D3F049C7EB}" type="datetime1">
               <a:rPr lang="fr-FR" smtClean="0"/>
-              <a:t>30/11/2023</a:t>
+              <a:t>01/12/2023</a:t>
             </a:fld>
             <a:endParaRPr lang="fr-FR"/>
           </a:p>
@@ -3487,7 +3475,7 @@
           <a:p>
             <a:fld id="{4CC5EE2E-B4AD-49CE-B06C-9C158645EF87}" type="datetime1">
               <a:rPr lang="fr-FR" smtClean="0"/>
-              <a:t>30/11/2023</a:t>
+              <a:t>01/12/2023</a:t>
             </a:fld>
             <a:endParaRPr lang="fr-FR"/>
           </a:p>
@@ -3854,7 +3842,7 @@
           <a:p>
             <a:fld id="{F0C5ED0A-D3FB-48C4-88F4-21DEA1ECB133}" type="datetime1">
               <a:rPr lang="fr-FR" smtClean="0"/>
-              <a:t>30/11/2023</a:t>
+              <a:t>01/12/2023</a:t>
             </a:fld>
             <a:endParaRPr lang="fr-FR"/>
           </a:p>
@@ -3972,7 +3960,7 @@
           <a:p>
             <a:fld id="{0CA3491F-207F-4849-87FF-CDE176DD3142}" type="datetime1">
               <a:rPr lang="fr-FR" smtClean="0"/>
-              <a:t>30/11/2023</a:t>
+              <a:t>01/12/2023</a:t>
             </a:fld>
             <a:endParaRPr lang="fr-FR"/>
           </a:p>
@@ -4067,7 +4055,7 @@
           <a:p>
             <a:fld id="{43C3EBE1-822B-496C-B0B2-F1462F8D26EF}" type="datetime1">
               <a:rPr lang="fr-FR" smtClean="0"/>
-              <a:t>30/11/2023</a:t>
+              <a:t>01/12/2023</a:t>
             </a:fld>
             <a:endParaRPr lang="fr-FR"/>
           </a:p>
@@ -4344,7 +4332,7 @@
           <a:p>
             <a:fld id="{552E3B72-29B3-4990-8AC2-5CE4B5693745}" type="datetime1">
               <a:rPr lang="fr-FR" smtClean="0"/>
-              <a:t>30/11/2023</a:t>
+              <a:t>01/12/2023</a:t>
             </a:fld>
             <a:endParaRPr lang="fr-FR"/>
           </a:p>
@@ -4514,7 +4502,7 @@
           <a:p>
             <a:fld id="{8F7EAAF1-A437-4DF7-A7DC-B023E69E426A}" type="datetime1">
               <a:rPr lang="fr-FR" smtClean="0"/>
-              <a:t>30/11/2023</a:t>
+              <a:t>01/12/2023</a:t>
             </a:fld>
             <a:endParaRPr lang="fr-FR"/>
           </a:p>
@@ -4767,7 +4755,7 @@
           <a:p>
             <a:fld id="{46DD2DC6-738E-411B-8100-D338F7C3DDCF}" type="datetime1">
               <a:rPr lang="fr-FR" smtClean="0"/>
-              <a:t>30/11/2023</a:t>
+              <a:t>01/12/2023</a:t>
             </a:fld>
             <a:endParaRPr lang="fr-FR"/>
           </a:p>
@@ -4937,7 +4925,7 @@
           <a:p>
             <a:fld id="{9FF9C81A-6B97-4B3B-B6A9-B06DAA19BF6F}" type="datetime1">
               <a:rPr lang="fr-FR" smtClean="0"/>
-              <a:t>30/11/2023</a:t>
+              <a:t>01/12/2023</a:t>
             </a:fld>
             <a:endParaRPr lang="fr-FR"/>
           </a:p>
@@ -5117,7 +5105,7 @@
           <a:p>
             <a:fld id="{C28D69FA-1CDB-4E25-B35A-7F2E472027E4}" type="datetime1">
               <a:rPr lang="fr-FR" smtClean="0"/>
-              <a:t>30/11/2023</a:t>
+              <a:t>01/12/2023</a:t>
             </a:fld>
             <a:endParaRPr lang="fr-FR"/>
           </a:p>
@@ -5363,7 +5351,7 @@
           <a:p>
             <a:fld id="{E699A69D-F659-4642-906B-2DE49899E336}" type="datetime1">
               <a:rPr lang="fr-FR" smtClean="0"/>
-              <a:t>30/11/2023</a:t>
+              <a:t>01/12/2023</a:t>
             </a:fld>
             <a:endParaRPr lang="fr-FR"/>
           </a:p>
@@ -5595,7 +5583,7 @@
           <a:p>
             <a:fld id="{4AC1591D-FD31-4A8B-B666-E4478AB36604}" type="datetime1">
               <a:rPr lang="fr-FR" smtClean="0"/>
-              <a:t>30/11/2023</a:t>
+              <a:t>01/12/2023</a:t>
             </a:fld>
             <a:endParaRPr lang="fr-FR"/>
           </a:p>
@@ -5969,7 +5957,7 @@
           <a:p>
             <a:fld id="{8B89C4CE-A836-4D8E-9F76-2010A1B9E245}" type="datetime1">
               <a:rPr lang="fr-FR" smtClean="0"/>
-              <a:t>30/11/2023</a:t>
+              <a:t>01/12/2023</a:t>
             </a:fld>
             <a:endParaRPr lang="fr-FR"/>
           </a:p>
@@ -6094,7 +6082,7 @@
           <a:p>
             <a:fld id="{86FC3D07-91EA-4D41-A695-8935519AFC55}" type="datetime1">
               <a:rPr lang="fr-FR" smtClean="0"/>
-              <a:t>30/11/2023</a:t>
+              <a:t>01/12/2023</a:t>
             </a:fld>
             <a:endParaRPr lang="fr-FR"/>
           </a:p>
@@ -6303,7 +6291,7 @@
           <a:p>
             <a:fld id="{EE5EF36D-543F-405A-BC72-23CA4B87E8C4}" type="datetime1">
               <a:rPr lang="fr-FR" smtClean="0"/>
-              <a:t>30/11/2023</a:t>
+              <a:t>01/12/2023</a:t>
             </a:fld>
             <a:endParaRPr lang="fr-FR"/>
           </a:p>
@@ -6667,7 +6655,7 @@
           <a:p>
             <a:fld id="{4041BD17-AC62-4B9F-8509-8330C5726903}" type="datetime1">
               <a:rPr lang="fr-FR" smtClean="0"/>
-              <a:t>30/11/2023</a:t>
+              <a:t>01/12/2023</a:t>
             </a:fld>
             <a:endParaRPr lang="fr-FR"/>
           </a:p>
@@ -6927,7 +6915,7 @@
           <a:p>
             <a:fld id="{382151A9-51F0-41A0-9588-B9342A03C8B8}" type="datetime1">
               <a:rPr lang="fr-FR" smtClean="0"/>
-              <a:t>30/11/2023</a:t>
+              <a:t>01/12/2023</a:t>
             </a:fld>
             <a:endParaRPr lang="fr-FR"/>
           </a:p>
@@ -7140,7 +7128,7 @@
           <a:p>
             <a:fld id="{0522A4F9-7044-4ED3-A3A2-15F4828A9EB2}" type="datetime1">
               <a:rPr lang="fr-FR" smtClean="0"/>
-              <a:t>30/11/2023</a:t>
+              <a:t>01/12/2023</a:t>
             </a:fld>
             <a:endParaRPr lang="fr-FR"/>
           </a:p>
@@ -7681,7 +7669,7 @@
           <a:p>
             <a:fld id="{05FF9444-7067-4409-9FFF-22EA971E66FC}" type="datetime1">
               <a:rPr lang="fr-FR" smtClean="0"/>
-              <a:t>30/11/2023</a:t>
+              <a:t>01/12/2023</a:t>
             </a:fld>
             <a:endParaRPr lang="fr-FR"/>
           </a:p>
@@ -10763,11 +10751,7 @@
             </a:r>
             <a:r>
               <a:rPr lang="fr-FR" dirty="0" smtClean="0"/>
-              <a:t>- </a:t>
-            </a:r>
-            <a:r>
-              <a:rPr lang="fr-FR" dirty="0" smtClean="0"/>
-              <a:t>Modélisation de la solution</a:t>
+              <a:t>- Modélisation de la solution</a:t>
             </a:r>
           </a:p>
           <a:p>
@@ -10783,7 +10767,6 @@
               <a:rPr lang="fr-FR" dirty="0"/>
               <a:t>Réalisation avec les outils choisis</a:t>
             </a:r>
-            <a:endParaRPr lang="fr-FR" dirty="0"/>
           </a:p>
         </p:txBody>
       </p:sp>
@@ -10817,7 +10800,6 @@
               <a:rPr lang="fr-FR" b="1" dirty="0"/>
               <a:t>: </a:t>
             </a:r>
-            <a:endParaRPr lang="fr-FR" b="1" dirty="0"/>
           </a:p>
           <a:p>
             <a:pPr lvl="0"/>
@@ -10951,29 +10933,8 @@
             </a:r>
             <a:r>
               <a:rPr lang="fr-FR" dirty="0" smtClean="0"/>
-              <a:t>- </a:t>
-            </a:r>
-            <a:r>
-              <a:rPr lang="fr-FR" dirty="0" smtClean="0"/>
-              <a:t>Informations groupées </a:t>
-            </a:r>
-            <a:r>
-              <a:rPr lang="fr-FR" dirty="0" smtClean="0"/>
-              <a:t>dans une </a:t>
-            </a:r>
-            <a:r>
-              <a:rPr lang="fr-FR" dirty="0" smtClean="0"/>
-              <a:t>platforme WEB </a:t>
-            </a:r>
-            <a:r>
-              <a:rPr lang="fr-FR" dirty="0" smtClean="0"/>
-              <a:t>(</a:t>
-            </a:r>
-            <a:r>
-              <a:rPr lang="fr-FR" dirty="0" smtClean="0"/>
-              <a:t>DHIS2)</a:t>
-            </a:r>
-            <a:endParaRPr lang="fr-FR" dirty="0" smtClean="0"/>
+              <a:t>- Informations groupées dans une platforme WEB (DHIS2)</a:t>
+            </a:r>
           </a:p>
           <a:p>
             <a:r>
@@ -12094,7 +12055,7 @@
         <p:spPr>
           <a:xfrm>
             <a:off x="445098" y="2486236"/>
-            <a:ext cx="10104946" cy="369332"/>
+            <a:ext cx="11481541" cy="369332"/>
           </a:xfrm>
           <a:prstGeom prst="rect">
             <a:avLst/>
@@ -12168,7 +12129,7 @@
               <a:t>éveloppement du </a:t>
             </a:r>
             <a:r>
-              <a:rPr lang="fr-FR" b="1" dirty="0">
+              <a:rPr lang="fr-FR" b="1" dirty="0" smtClean="0">
                 <a:solidFill>
                   <a:srgbClr val="00B050"/>
                 </a:solidFill>
@@ -12176,8 +12137,20 @@
               <a:t>S</a:t>
             </a:r>
             <a:r>
-              <a:rPr lang="fr-FR" b="1" dirty="0"/>
-              <a:t>ystème </a:t>
+              <a:rPr lang="fr-FR" b="1" dirty="0" smtClean="0"/>
+              <a:t>ystème d’</a:t>
+            </a:r>
+            <a:r>
+              <a:rPr lang="fr-FR" b="1" dirty="0" smtClean="0">
+                <a:solidFill>
+                  <a:schemeClr val="accent6"/>
+                </a:solidFill>
+              </a:rPr>
+              <a:t>I</a:t>
+            </a:r>
+            <a:r>
+              <a:rPr lang="fr-FR" b="1" dirty="0" smtClean="0"/>
+              <a:t>nformation </a:t>
             </a:r>
             <a:r>
               <a:rPr lang="fr-FR" b="1" dirty="0" smtClean="0"/>

</xml_diff>

<commit_message>
Page Admin de Django
</commit_message>
<xml_diff>
--- a/Présentation de mémoire L3.pptx
+++ b/Présentation de mémoire L3.pptx
@@ -229,7 +229,7 @@
           <a:p>
             <a:fld id="{133D0A66-792F-4F77-B291-95C858246B95}" type="datetimeFigureOut">
               <a:rPr lang="fr-FR" smtClean="0"/>
-              <a:t>04/12/2023</a:t>
+              <a:t>05/12/2023</a:t>
             </a:fld>
             <a:endParaRPr lang="fr-FR"/>
           </a:p>
@@ -394,7 +394,7 @@
           <a:p>
             <a:fld id="{8775F7A3-26D0-4162-B6AA-21C8CCEB942F}" type="datetimeFigureOut">
               <a:rPr lang="fr-FR" smtClean="0"/>
-              <a:t>04/12/2023</a:t>
+              <a:t>05/12/2023</a:t>
             </a:fld>
             <a:endParaRPr lang="fr-FR"/>
           </a:p>
@@ -1617,31 +1617,7 @@
                 <a:ea typeface="+mn-ea"/>
                 <a:cs typeface="+mn-cs"/>
               </a:rPr>
-              <a:t>DHIS2 est une plateforme logicielle </a:t>
-            </a:r>
-            <a:r>
-              <a:rPr lang="fr-FR" sz="1200" kern="1200" dirty="0" smtClean="0">
-                <a:solidFill>
-                  <a:schemeClr val="tx1"/>
-                </a:solidFill>
-                <a:effectLst/>
-                <a:latin typeface="+mn-lt"/>
-                <a:ea typeface="+mn-ea"/>
-                <a:cs typeface="+mn-cs"/>
-              </a:rPr>
-              <a:t>destinée </a:t>
-            </a:r>
-            <a:r>
-              <a:rPr lang="fr-FR" sz="1200" kern="1200" dirty="0" smtClean="0">
-                <a:solidFill>
-                  <a:schemeClr val="tx1"/>
-                </a:solidFill>
-                <a:effectLst/>
-                <a:latin typeface="+mn-lt"/>
-                <a:ea typeface="+mn-ea"/>
-                <a:cs typeface="+mn-cs"/>
-              </a:rPr>
-              <a:t>à la collecte, la validation, la visualisation et l'analyse des données dans le domaine de la santé.</a:t>
+              <a:t>DHIS2 est une plateforme logicielle destinée à la collecte, la validation, la visualisation et l'analyse des données dans le domaine de la santé.</a:t>
             </a:r>
           </a:p>
           <a:p>
@@ -1920,26 +1896,38 @@
           <a:lstStyle/>
           <a:p>
             <a:r>
-              <a:rPr lang="fr-FR" b="1" smtClean="0"/>
+              <a:rPr lang="fr-FR" b="0" dirty="0" smtClean="0"/>
+              <a:t>L’application </a:t>
+            </a:r>
+            <a:r>
+              <a:rPr lang="fr-FR" b="1" dirty="0" smtClean="0"/>
               <a:t>Tableau</a:t>
             </a:r>
             <a:r>
-              <a:rPr lang="fr-FR" b="1" baseline="0" smtClean="0"/>
-              <a:t> de bord</a:t>
-            </a:r>
-            <a:r>
-              <a:rPr lang="fr-FR" b="0" baseline="0" smtClean="0"/>
+              <a:rPr lang="fr-FR" b="1" baseline="0" dirty="0" smtClean="0"/>
+              <a:t> </a:t>
+            </a:r>
+            <a:r>
+              <a:rPr lang="fr-FR" b="1" baseline="0" dirty="0" smtClean="0"/>
+              <a:t>de bord</a:t>
+            </a:r>
+            <a:r>
+              <a:rPr lang="fr-FR" b="0" baseline="0" dirty="0" smtClean="0"/>
               <a:t> utilise l’application </a:t>
             </a:r>
             <a:r>
-              <a:rPr lang="fr-FR" b="1" baseline="0" smtClean="0"/>
+              <a:rPr lang="fr-FR" b="1" baseline="0" dirty="0" smtClean="0"/>
               <a:t>Visualiseur de données (Data Visualizer) </a:t>
             </a:r>
             <a:r>
-              <a:rPr lang="fr-FR" b="0" baseline="0" smtClean="0"/>
-              <a:t>pour les afficher les données</a:t>
-            </a:r>
-            <a:endParaRPr lang="fr-FR" b="1"/>
+              <a:rPr lang="fr-FR" b="0" baseline="0" dirty="0" smtClean="0"/>
+              <a:t>pour les afficher les </a:t>
+            </a:r>
+            <a:r>
+              <a:rPr lang="fr-FR" b="0" baseline="0" dirty="0" smtClean="0"/>
+              <a:t>données.</a:t>
+            </a:r>
+            <a:endParaRPr lang="fr-FR" b="1" dirty="0"/>
           </a:p>
         </p:txBody>
       </p:sp>
@@ -2425,7 +2413,7 @@
           <a:p>
             <a:fld id="{B1E50EB4-5975-4030-B7E5-552F8398C0AC}" type="datetime1">
               <a:rPr lang="fr-FR" smtClean="0"/>
-              <a:t>04/12/2023</a:t>
+              <a:t>05/12/2023</a:t>
             </a:fld>
             <a:endParaRPr lang="fr-FR"/>
           </a:p>
@@ -2595,7 +2583,7 @@
           <a:p>
             <a:fld id="{2F14DBB5-6410-4C8A-92C0-64DAE7134526}" type="datetime1">
               <a:rPr lang="fr-FR" smtClean="0"/>
-              <a:t>04/12/2023</a:t>
+              <a:t>05/12/2023</a:t>
             </a:fld>
             <a:endParaRPr lang="fr-FR"/>
           </a:p>
@@ -2775,7 +2763,7 @@
           <a:p>
             <a:fld id="{4A4DD193-0D95-42CA-BAA4-BF368DC59BCE}" type="datetime1">
               <a:rPr lang="fr-FR" smtClean="0"/>
-              <a:t>04/12/2023</a:t>
+              <a:t>05/12/2023</a:t>
             </a:fld>
             <a:endParaRPr lang="fr-FR"/>
           </a:p>
@@ -2967,7 +2955,7 @@
           <a:p>
             <a:fld id="{63732620-C153-4889-806A-0EE13918376E}" type="datetime1">
               <a:rPr lang="fr-FR" smtClean="0"/>
-              <a:t>04/12/2023</a:t>
+              <a:t>05/12/2023</a:t>
             </a:fld>
             <a:endParaRPr lang="fr-FR"/>
           </a:p>
@@ -3137,7 +3125,7 @@
           <a:p>
             <a:fld id="{665D1196-11E3-4473-8460-25175E0562BA}" type="datetime1">
               <a:rPr lang="fr-FR" smtClean="0"/>
-              <a:t>04/12/2023</a:t>
+              <a:t>05/12/2023</a:t>
             </a:fld>
             <a:endParaRPr lang="fr-FR"/>
           </a:p>
@@ -3383,7 +3371,7 @@
           <a:p>
             <a:fld id="{3DA90518-B627-4085-AA9A-79D3F049C7EB}" type="datetime1">
               <a:rPr lang="fr-FR" smtClean="0"/>
-              <a:t>04/12/2023</a:t>
+              <a:t>05/12/2023</a:t>
             </a:fld>
             <a:endParaRPr lang="fr-FR"/>
           </a:p>
@@ -3615,7 +3603,7 @@
           <a:p>
             <a:fld id="{4CC5EE2E-B4AD-49CE-B06C-9C158645EF87}" type="datetime1">
               <a:rPr lang="fr-FR" smtClean="0"/>
-              <a:t>04/12/2023</a:t>
+              <a:t>05/12/2023</a:t>
             </a:fld>
             <a:endParaRPr lang="fr-FR"/>
           </a:p>
@@ -3982,7 +3970,7 @@
           <a:p>
             <a:fld id="{F0C5ED0A-D3FB-48C4-88F4-21DEA1ECB133}" type="datetime1">
               <a:rPr lang="fr-FR" smtClean="0"/>
-              <a:t>04/12/2023</a:t>
+              <a:t>05/12/2023</a:t>
             </a:fld>
             <a:endParaRPr lang="fr-FR"/>
           </a:p>
@@ -4100,7 +4088,7 @@
           <a:p>
             <a:fld id="{0CA3491F-207F-4849-87FF-CDE176DD3142}" type="datetime1">
               <a:rPr lang="fr-FR" smtClean="0"/>
-              <a:t>04/12/2023</a:t>
+              <a:t>05/12/2023</a:t>
             </a:fld>
             <a:endParaRPr lang="fr-FR"/>
           </a:p>
@@ -4195,7 +4183,7 @@
           <a:p>
             <a:fld id="{43C3EBE1-822B-496C-B0B2-F1462F8D26EF}" type="datetime1">
               <a:rPr lang="fr-FR" smtClean="0"/>
-              <a:t>04/12/2023</a:t>
+              <a:t>05/12/2023</a:t>
             </a:fld>
             <a:endParaRPr lang="fr-FR"/>
           </a:p>
@@ -4472,7 +4460,7 @@
           <a:p>
             <a:fld id="{552E3B72-29B3-4990-8AC2-5CE4B5693745}" type="datetime1">
               <a:rPr lang="fr-FR" smtClean="0"/>
-              <a:t>04/12/2023</a:t>
+              <a:t>05/12/2023</a:t>
             </a:fld>
             <a:endParaRPr lang="fr-FR"/>
           </a:p>
@@ -4642,7 +4630,7 @@
           <a:p>
             <a:fld id="{8F7EAAF1-A437-4DF7-A7DC-B023E69E426A}" type="datetime1">
               <a:rPr lang="fr-FR" smtClean="0"/>
-              <a:t>04/12/2023</a:t>
+              <a:t>05/12/2023</a:t>
             </a:fld>
             <a:endParaRPr lang="fr-FR"/>
           </a:p>
@@ -4895,7 +4883,7 @@
           <a:p>
             <a:fld id="{46DD2DC6-738E-411B-8100-D338F7C3DDCF}" type="datetime1">
               <a:rPr lang="fr-FR" smtClean="0"/>
-              <a:t>04/12/2023</a:t>
+              <a:t>05/12/2023</a:t>
             </a:fld>
             <a:endParaRPr lang="fr-FR"/>
           </a:p>
@@ -5065,7 +5053,7 @@
           <a:p>
             <a:fld id="{9FF9C81A-6B97-4B3B-B6A9-B06DAA19BF6F}" type="datetime1">
               <a:rPr lang="fr-FR" smtClean="0"/>
-              <a:t>04/12/2023</a:t>
+              <a:t>05/12/2023</a:t>
             </a:fld>
             <a:endParaRPr lang="fr-FR"/>
           </a:p>
@@ -5245,7 +5233,7 @@
           <a:p>
             <a:fld id="{C28D69FA-1CDB-4E25-B35A-7F2E472027E4}" type="datetime1">
               <a:rPr lang="fr-FR" smtClean="0"/>
-              <a:t>04/12/2023</a:t>
+              <a:t>05/12/2023</a:t>
             </a:fld>
             <a:endParaRPr lang="fr-FR"/>
           </a:p>
@@ -5491,7 +5479,7 @@
           <a:p>
             <a:fld id="{E699A69D-F659-4642-906B-2DE49899E336}" type="datetime1">
               <a:rPr lang="fr-FR" smtClean="0"/>
-              <a:t>04/12/2023</a:t>
+              <a:t>05/12/2023</a:t>
             </a:fld>
             <a:endParaRPr lang="fr-FR"/>
           </a:p>
@@ -5723,7 +5711,7 @@
           <a:p>
             <a:fld id="{4AC1591D-FD31-4A8B-B666-E4478AB36604}" type="datetime1">
               <a:rPr lang="fr-FR" smtClean="0"/>
-              <a:t>04/12/2023</a:t>
+              <a:t>05/12/2023</a:t>
             </a:fld>
             <a:endParaRPr lang="fr-FR"/>
           </a:p>
@@ -6097,7 +6085,7 @@
           <a:p>
             <a:fld id="{8B89C4CE-A836-4D8E-9F76-2010A1B9E245}" type="datetime1">
               <a:rPr lang="fr-FR" smtClean="0"/>
-              <a:t>04/12/2023</a:t>
+              <a:t>05/12/2023</a:t>
             </a:fld>
             <a:endParaRPr lang="fr-FR"/>
           </a:p>
@@ -6222,7 +6210,7 @@
           <a:p>
             <a:fld id="{86FC3D07-91EA-4D41-A695-8935519AFC55}" type="datetime1">
               <a:rPr lang="fr-FR" smtClean="0"/>
-              <a:t>04/12/2023</a:t>
+              <a:t>05/12/2023</a:t>
             </a:fld>
             <a:endParaRPr lang="fr-FR"/>
           </a:p>
@@ -6431,7 +6419,7 @@
           <a:p>
             <a:fld id="{EE5EF36D-543F-405A-BC72-23CA4B87E8C4}" type="datetime1">
               <a:rPr lang="fr-FR" smtClean="0"/>
-              <a:t>04/12/2023</a:t>
+              <a:t>05/12/2023</a:t>
             </a:fld>
             <a:endParaRPr lang="fr-FR"/>
           </a:p>
@@ -6795,7 +6783,7 @@
           <a:p>
             <a:fld id="{4041BD17-AC62-4B9F-8509-8330C5726903}" type="datetime1">
               <a:rPr lang="fr-FR" smtClean="0"/>
-              <a:t>04/12/2023</a:t>
+              <a:t>05/12/2023</a:t>
             </a:fld>
             <a:endParaRPr lang="fr-FR"/>
           </a:p>
@@ -7055,7 +7043,7 @@
           <a:p>
             <a:fld id="{382151A9-51F0-41A0-9588-B9342A03C8B8}" type="datetime1">
               <a:rPr lang="fr-FR" smtClean="0"/>
-              <a:t>04/12/2023</a:t>
+              <a:t>05/12/2023</a:t>
             </a:fld>
             <a:endParaRPr lang="fr-FR"/>
           </a:p>
@@ -7268,7 +7256,7 @@
           <a:p>
             <a:fld id="{0522A4F9-7044-4ED3-A3A2-15F4828A9EB2}" type="datetime1">
               <a:rPr lang="fr-FR" smtClean="0"/>
-              <a:t>04/12/2023</a:t>
+              <a:t>05/12/2023</a:t>
             </a:fld>
             <a:endParaRPr lang="fr-FR"/>
           </a:p>
@@ -7809,7 +7797,7 @@
           <a:p>
             <a:fld id="{05FF9444-7067-4409-9FFF-22EA971E66FC}" type="datetime1">
               <a:rPr lang="fr-FR" smtClean="0"/>
-              <a:t>04/12/2023</a:t>
+              <a:t>05/12/2023</a:t>
             </a:fld>
             <a:endParaRPr lang="fr-FR"/>
           </a:p>
@@ -9366,84 +9354,46 @@
           </a:p>
         </p:txBody>
       </p:sp>
-      <p:grpSp>
-        <p:nvGrpSpPr>
-          <p:cNvPr id="11" name="Group 10"/>
-          <p:cNvGrpSpPr/>
+      <p:pic>
+        <p:nvPicPr>
+          <p:cNvPr id="7" name="Picture 6"/>
+          <p:cNvPicPr>
+            <a:picLocks noChangeAspect="1"/>
+          </p:cNvPicPr>
           <p:nvPr/>
-        </p:nvGrpSpPr>
-        <p:grpSpPr>
+        </p:nvPicPr>
+        <p:blipFill>
+          <a:blip r:embed="rId2">
+            <a:clrChange>
+              <a:clrFrom>
+                <a:srgbClr val="FFFFFF"/>
+              </a:clrFrom>
+              <a:clrTo>
+                <a:srgbClr val="FFFFFF">
+                  <a:alpha val="0"/>
+                </a:srgbClr>
+              </a:clrTo>
+            </a:clrChange>
+            <a:extLst>
+              <a:ext uri="{28A0092B-C50C-407E-A947-70E740481C1C}">
+                <a14:useLocalDpi xmlns:a14="http://schemas.microsoft.com/office/drawing/2010/main" val="0"/>
+              </a:ext>
+            </a:extLst>
+          </a:blip>
+          <a:stretch>
+            <a:fillRect/>
+          </a:stretch>
+        </p:blipFill>
+        <p:spPr>
           <a:xfrm>
-            <a:off x="3761071" y="1393055"/>
-            <a:ext cx="5760720" cy="5464945"/>
-            <a:chOff x="135556" y="978173"/>
-            <a:chExt cx="5760720" cy="5464945"/>
+            <a:off x="3231433" y="1169951"/>
+            <a:ext cx="5761219" cy="5553937"/>
           </a:xfrm>
-        </p:grpSpPr>
-        <p:pic>
-          <p:nvPicPr>
-            <p:cNvPr id="5" name="Picture 4" descr="D:\Kenn\AdR\Projet de mémoire\Documentation\Cas d'utilisation - Plateforme WEB.png"/>
-            <p:cNvPicPr/>
-            <p:nvPr/>
-          </p:nvPicPr>
-          <p:blipFill>
-            <a:blip r:embed="rId2">
-              <a:extLst>
-                <a:ext uri="{28A0092B-C50C-407E-A947-70E740481C1C}">
-                  <a14:useLocalDpi xmlns:a14="http://schemas.microsoft.com/office/drawing/2010/main" val="0"/>
-                </a:ext>
-              </a:extLst>
-            </a:blip>
-            <a:srcRect/>
-            <a:stretch>
-              <a:fillRect/>
-            </a:stretch>
-          </p:blipFill>
-          <p:spPr bwMode="auto">
-            <a:xfrm>
-              <a:off x="135556" y="978173"/>
-              <a:ext cx="5760720" cy="5073650"/>
-            </a:xfrm>
-            <a:prstGeom prst="rect">
-              <a:avLst/>
-            </a:prstGeom>
-            <a:noFill/>
-            <a:ln>
-              <a:noFill/>
-            </a:ln>
-          </p:spPr>
-        </p:pic>
-        <p:sp>
-          <p:nvSpPr>
-            <p:cNvPr id="4" name="TextBox 3"/>
-            <p:cNvSpPr txBox="1"/>
-            <p:nvPr/>
-          </p:nvSpPr>
-          <p:spPr>
-            <a:xfrm>
-              <a:off x="1132740" y="6073786"/>
-              <a:ext cx="3836628" cy="369332"/>
-            </a:xfrm>
-            <a:prstGeom prst="rect">
-              <a:avLst/>
-            </a:prstGeom>
-            <a:noFill/>
-          </p:spPr>
-          <p:txBody>
-            <a:bodyPr wrap="none" rtlCol="0">
-              <a:spAutoFit/>
-            </a:bodyPr>
-            <a:lstStyle/>
-            <a:p>
-              <a:r>
-                <a:rPr lang="fr-FR" b="1" dirty="0" smtClean="0"/>
-                <a:t>UML : Diagramme de cas d’utilisations</a:t>
-              </a:r>
-              <a:endParaRPr lang="fr-FR" b="1" dirty="0"/>
-            </a:p>
-          </p:txBody>
-        </p:sp>
-      </p:grpSp>
+          <a:prstGeom prst="rect">
+            <a:avLst/>
+          </a:prstGeom>
+        </p:spPr>
+      </p:pic>
     </p:spTree>
     <p:extLst>
       <p:ext uri="{BB962C8B-B14F-4D97-AF65-F5344CB8AC3E}">
@@ -9685,6 +9635,16 @@
         </p:nvPicPr>
         <p:blipFill>
           <a:blip r:embed="rId2">
+            <a:clrChange>
+              <a:clrFrom>
+                <a:srgbClr val="FFFFFF"/>
+              </a:clrFrom>
+              <a:clrTo>
+                <a:srgbClr val="FFFFFF">
+                  <a:alpha val="0"/>
+                </a:srgbClr>
+              </a:clrTo>
+            </a:clrChange>
             <a:extLst>
               <a:ext uri="{28A0092B-C50C-407E-A947-70E740481C1C}">
                 <a14:useLocalDpi xmlns:a14="http://schemas.microsoft.com/office/drawing/2010/main" val="0"/>
@@ -9715,6 +9675,16 @@
         </p:nvPicPr>
         <p:blipFill>
           <a:blip r:embed="rId3">
+            <a:clrChange>
+              <a:clrFrom>
+                <a:srgbClr val="FFFFFF"/>
+              </a:clrFrom>
+              <a:clrTo>
+                <a:srgbClr val="FFFFFF">
+                  <a:alpha val="0"/>
+                </a:srgbClr>
+              </a:clrTo>
+            </a:clrChange>
             <a:extLst>
               <a:ext uri="{28A0092B-C50C-407E-A947-70E740481C1C}">
                 <a14:useLocalDpi xmlns:a14="http://schemas.microsoft.com/office/drawing/2010/main" val="0"/>
@@ -9745,6 +9715,16 @@
         </p:nvPicPr>
         <p:blipFill>
           <a:blip r:embed="rId4">
+            <a:clrChange>
+              <a:clrFrom>
+                <a:srgbClr val="FFFFFF"/>
+              </a:clrFrom>
+              <a:clrTo>
+                <a:srgbClr val="FFFFFF">
+                  <a:alpha val="0"/>
+                </a:srgbClr>
+              </a:clrTo>
+            </a:clrChange>
             <a:extLst>
               <a:ext uri="{28A0092B-C50C-407E-A947-70E740481C1C}">
                 <a14:useLocalDpi xmlns:a14="http://schemas.microsoft.com/office/drawing/2010/main" val="0"/>
@@ -11478,11 +11458,11 @@
             <a:pPr algn="ctr"/>
             <a:r>
               <a:rPr lang="fr-FR" sz="2400" dirty="0"/>
-              <a:t>Analyse de l’existant de </a:t>
+              <a:t>Analyse de </a:t>
             </a:r>
             <a:r>
               <a:rPr lang="fr-FR" sz="2400" dirty="0" smtClean="0"/>
-              <a:t>l’entreprise</a:t>
+              <a:t>l’existant</a:t>
             </a:r>
             <a:endParaRPr lang="fr-FR" sz="2400" dirty="0"/>
           </a:p>
@@ -11534,8 +11514,13 @@
             <a:pPr algn="ctr"/>
             <a:r>
               <a:rPr lang="fr-FR" sz="2400" dirty="0"/>
-              <a:t>Analyse de besoins de l’entreprise</a:t>
-            </a:r>
+              <a:t>Analyse de </a:t>
+            </a:r>
+            <a:r>
+              <a:rPr lang="fr-FR" sz="2400" dirty="0" smtClean="0"/>
+              <a:t>besoins</a:t>
+            </a:r>
+            <a:endParaRPr lang="fr-FR" sz="2400" dirty="0"/>
           </a:p>
         </p:txBody>
       </p:sp>
@@ -12437,7 +12422,6 @@
               <a:rPr lang="fr-FR" dirty="0"/>
               <a:t>ANDRIAMIZARASOA</a:t>
             </a:r>
-            <a:endParaRPr lang="fr-FR" dirty="0"/>
           </a:p>
         </p:txBody>
       </p:sp>
@@ -12588,29 +12572,7 @@
                 </a:effectLst>
                 <a:cs typeface="Times New Roman" panose="02020603050405020304" pitchFamily="18" charset="0"/>
               </a:rPr>
-              <a:t>Organigramme de </a:t>
-            </a:r>
-            <a:r>
-              <a:rPr lang="fr-FR" sz="5000" b="1" dirty="0" smtClean="0">
-                <a:ln w="10160">
-                  <a:solidFill>
-                    <a:srgbClr val="00B050"/>
-                  </a:solidFill>
-                  <a:prstDash val="solid"/>
-                </a:ln>
-                <a:solidFill>
-                  <a:srgbClr val="FFFFFF"/>
-                </a:solidFill>
-                <a:effectLst>
-                  <a:outerShdw blurRad="38100" dist="38100" dir="2700000" algn="tl">
-                    <a:srgbClr val="000000">
-                      <a:alpha val="43137"/>
-                    </a:srgbClr>
-                  </a:outerShdw>
-                </a:effectLst>
-                <a:cs typeface="Times New Roman" panose="02020603050405020304" pitchFamily="18" charset="0"/>
-              </a:rPr>
-              <a:t>MSANP </a:t>
+              <a:t>Organigramme de MSANP </a:t>
             </a:r>
             <a:endParaRPr lang="fr-FR" sz="5000" b="1" dirty="0">
               <a:ln w="10160">
@@ -13553,7 +13515,7 @@
         </p:blipFill>
         <p:spPr>
           <a:xfrm>
-            <a:off x="788288" y="3826598"/>
+            <a:off x="788288" y="3879599"/>
             <a:ext cx="2708154" cy="1207433"/>
           </a:xfrm>
           <a:prstGeom prst="rect">

</xml_diff>